<commit_message>
intermediate II + pdf
</commit_message>
<xml_diff>
--- a/RESA_LINUX_intermediate_II.pptx
+++ b/RESA_LINUX_intermediate_II.pptx
@@ -5,17 +5,16 @@
     <p:sldMasterId id="2147484330" r:id="rId4"/>
   </p:sldMasterIdLst>
   <p:notesMasterIdLst>
-    <p:notesMasterId r:id="rId10"/>
+    <p:notesMasterId r:id="rId9"/>
   </p:notesMasterIdLst>
   <p:handoutMasterIdLst>
-    <p:handoutMasterId r:id="rId11"/>
+    <p:handoutMasterId r:id="rId10"/>
   </p:handoutMasterIdLst>
   <p:sldIdLst>
     <p:sldId id="256" r:id="rId5"/>
-    <p:sldId id="261" r:id="rId6"/>
-    <p:sldId id="258" r:id="rId7"/>
-    <p:sldId id="259" r:id="rId8"/>
-    <p:sldId id="260" r:id="rId9"/>
+    <p:sldId id="258" r:id="rId6"/>
+    <p:sldId id="259" r:id="rId7"/>
+    <p:sldId id="260" r:id="rId8"/>
   </p:sldIdLst>
   <p:sldSz cx="12436475" cy="6994525"/>
   <p:notesSz cx="6858000" cy="9144000"/>
@@ -116,7 +115,7 @@
   </p:defaultTextStyle>
   <p:extLst>
     <p:ext uri="{EFAFB233-063F-42B5-8137-9DF3F51BA10A}">
-      <p15:sldGuideLst xmlns:p15="http://schemas.microsoft.com/office/powerpoint/2012/main" xmlns="">
+      <p15:sldGuideLst xmlns="" xmlns:p15="http://schemas.microsoft.com/office/powerpoint/2012/main">
         <p15:guide id="1" orient="horz" pos="188">
           <p15:clr>
             <a:srgbClr val="A4A3A4"/>
@@ -230,7 +229,7 @@
       </p15:sldGuideLst>
     </p:ext>
     <p:ext uri="{2D200454-40CA-4A62-9FC3-DE9A4176ACB9}">
-      <p15:notesGuideLst xmlns:p15="http://schemas.microsoft.com/office/powerpoint/2012/main" xmlns="">
+      <p15:notesGuideLst xmlns="" xmlns:p15="http://schemas.microsoft.com/office/powerpoint/2012/main">
         <p15:guide id="1" orient="horz" pos="2880">
           <p15:clr>
             <a:srgbClr val="A4A3A4"/>
@@ -1039,29 +1038,6 @@
           <a:bodyPr/>
           <a:lstStyle/>
           <a:p>
-            <a:pPr lvl="1"/>
-            <a:r>
-              <a:rPr lang="en-US" sz="1600" dirty="0" smtClean="0"/>
-              <a:t>Optional: </a:t>
-            </a:r>
-            <a:r>
-              <a:rPr lang="en-US" sz="1600" dirty="0" err="1" smtClean="0"/>
-              <a:t>Zukunftsaussicht</a:t>
-            </a:r>
-            <a:endParaRPr lang="en-US" sz="1600" dirty="0" smtClean="0"/>
-          </a:p>
-          <a:p>
-            <a:pPr lvl="1"/>
-            <a:r>
-              <a:rPr lang="en-US" sz="1600" dirty="0" err="1" smtClean="0"/>
-              <a:t>Anforderungen</a:t>
-            </a:r>
-            <a:r>
-              <a:rPr lang="en-US" sz="1600" dirty="0" smtClean="0"/>
-              <a:t>: Connected Car, Smart Home, Internet of Things, etc..</a:t>
-            </a:r>
-          </a:p>
-          <a:p>
             <a:endParaRPr lang="en-US" dirty="0"/>
           </a:p>
         </p:txBody>
@@ -1269,29 +1245,6 @@
           <a:bodyPr/>
           <a:lstStyle/>
           <a:p>
-            <a:pPr lvl="1"/>
-            <a:r>
-              <a:rPr lang="en-US" sz="1600" dirty="0" smtClean="0"/>
-              <a:t>Optional: </a:t>
-            </a:r>
-            <a:r>
-              <a:rPr lang="en-US" sz="1600" dirty="0" err="1" smtClean="0"/>
-              <a:t>Zukunftsaussicht</a:t>
-            </a:r>
-            <a:endParaRPr lang="en-US" sz="1600" dirty="0" smtClean="0"/>
-          </a:p>
-          <a:p>
-            <a:pPr lvl="1"/>
-            <a:r>
-              <a:rPr lang="en-US" sz="1600" dirty="0" err="1" smtClean="0"/>
-              <a:t>Anforderungen</a:t>
-            </a:r>
-            <a:r>
-              <a:rPr lang="en-US" sz="1600" dirty="0" smtClean="0"/>
-              <a:t>: Connected Car, Smart Home, Internet of Things, etc..</a:t>
-            </a:r>
-          </a:p>
-          <a:p>
             <a:endParaRPr lang="en-US" dirty="0"/>
           </a:p>
         </p:txBody>
@@ -1410,7 +1363,7 @@
           <a:bodyPr/>
           <a:lstStyle/>
           <a:p>
-            <a:fld id="{DA341ACA-AFEC-4CF2-88DA-120F7DBFAA76}" type="datetime1">
+            <a:fld id="{0FB5C38E-1634-47E6-8404-50CF48BE15D5}" type="datetime1">
               <a:rPr lang="en-US" smtClean="0"/>
               <a:t>12/17/2015</a:t>
             </a:fld>
@@ -1445,7 +1398,7 @@
     </p:spTree>
     <p:extLst>
       <p:ext uri="{BB962C8B-B14F-4D97-AF65-F5344CB8AC3E}">
-        <p14:creationId xmlns:p14="http://schemas.microsoft.com/office/powerpoint/2010/main" val="1730405100"/>
+        <p14:creationId xmlns:p14="http://schemas.microsoft.com/office/powerpoint/2010/main" val="121312355"/>
       </p:ext>
     </p:extLst>
   </p:cSld>
@@ -1501,146 +1454,28 @@
           <a:p>
             <a:r>
               <a:rPr lang="en-US" dirty="0" err="1" smtClean="0"/>
-              <a:t>Umsetzung</a:t>
-            </a:r>
-            <a:r>
-              <a:rPr lang="en-US" dirty="0" smtClean="0"/>
-              <a:t> von </a:t>
+              <a:t>Kurze</a:t>
+            </a:r>
+            <a:r>
+              <a:rPr lang="en-US" dirty="0" smtClean="0"/>
+              <a:t> </a:t>
             </a:r>
             <a:r>
               <a:rPr lang="en-US" dirty="0" err="1" smtClean="0"/>
-              <a:t>Anforderungen</a:t>
-            </a:r>
-            <a:endParaRPr lang="en-US" dirty="0" smtClean="0"/>
-          </a:p>
-          <a:p>
-            <a:pPr lvl="1"/>
-            <a:r>
-              <a:rPr lang="en-US" dirty="0" smtClean="0"/>
-              <a:t>Construction</a:t>
-            </a:r>
-          </a:p>
-          <a:p>
-            <a:pPr lvl="2"/>
-            <a:r>
-              <a:rPr lang="en-US" dirty="0" smtClean="0"/>
-              <a:t>Implementation</a:t>
-            </a:r>
-          </a:p>
-          <a:p>
-            <a:endParaRPr lang="en-US" dirty="0" smtClean="0"/>
-          </a:p>
-          <a:p>
-            <a:r>
-              <a:rPr lang="en-US" dirty="0" err="1" smtClean="0"/>
-              <a:t>Architektur</a:t>
-            </a:r>
-            <a:r>
-              <a:rPr lang="en-US" dirty="0" smtClean="0"/>
-              <a:t> </a:t>
-            </a:r>
-            <a:r>
-              <a:rPr lang="en-US" dirty="0" err="1" smtClean="0"/>
-              <a:t>Prinzipien</a:t>
-            </a:r>
-            <a:endParaRPr lang="en-US" dirty="0" smtClean="0"/>
-          </a:p>
-          <a:p>
-            <a:pPr lvl="1"/>
-            <a:r>
-              <a:rPr lang="en-US" dirty="0" smtClean="0"/>
-              <a:t>Design </a:t>
-            </a:r>
-            <a:r>
-              <a:rPr lang="en-US" dirty="0" err="1" smtClean="0"/>
-              <a:t>Dokument</a:t>
-            </a:r>
-            <a:endParaRPr lang="en-US" dirty="0" smtClean="0"/>
-          </a:p>
-          <a:p>
-            <a:pPr lvl="1"/>
-            <a:r>
-              <a:rPr lang="en-US" dirty="0" err="1" smtClean="0"/>
-              <a:t>erkennbare</a:t>
-            </a:r>
-            <a:r>
-              <a:rPr lang="en-US" dirty="0" smtClean="0"/>
-              <a:t> Patterns?</a:t>
-            </a:r>
-          </a:p>
-          <a:p>
-            <a:pPr lvl="1"/>
-            <a:r>
-              <a:rPr lang="en-US" dirty="0" err="1" smtClean="0"/>
-              <a:t>Schichtentrennung</a:t>
-            </a:r>
-            <a:endParaRPr lang="en-US" dirty="0" smtClean="0"/>
-          </a:p>
-          <a:p>
-            <a:endParaRPr lang="en-US" dirty="0" smtClean="0"/>
-          </a:p>
-          <a:p>
-            <a:r>
-              <a:rPr lang="en-US" dirty="0" err="1" smtClean="0"/>
-              <a:t>Analyse</a:t>
-            </a:r>
-            <a:r>
-              <a:rPr lang="en-US" dirty="0" smtClean="0"/>
-              <a:t> des </a:t>
-            </a:r>
-            <a:r>
-              <a:rPr lang="en-US" dirty="0" err="1" smtClean="0"/>
-              <a:t>Sourcecodes</a:t>
-            </a:r>
-            <a:endParaRPr lang="en-US" dirty="0" smtClean="0"/>
-          </a:p>
-          <a:p>
-            <a:pPr lvl="1"/>
-            <a:r>
-              <a:rPr lang="en-US" dirty="0" err="1" smtClean="0"/>
-              <a:t>statisch</a:t>
-            </a:r>
-            <a:endParaRPr lang="en-US" dirty="0" smtClean="0"/>
-          </a:p>
-          <a:p>
-            <a:pPr lvl="1"/>
-            <a:r>
-              <a:rPr lang="en-US" dirty="0" smtClean="0"/>
-              <a:t> </a:t>
-            </a:r>
-            <a:r>
-              <a:rPr lang="en-US" dirty="0" err="1" smtClean="0"/>
-              <a:t>dynamisch</a:t>
-            </a:r>
-            <a:endParaRPr lang="en-US" dirty="0" smtClean="0"/>
-          </a:p>
-          <a:p>
-            <a:endParaRPr lang="en-US" dirty="0" smtClean="0"/>
-          </a:p>
-          <a:p>
-            <a:r>
-              <a:rPr lang="en-US" dirty="0" err="1" smtClean="0"/>
-              <a:t>Sicherheit</a:t>
-            </a:r>
-            <a:endParaRPr lang="en-US" dirty="0" smtClean="0"/>
-          </a:p>
-          <a:p>
-            <a:pPr lvl="1"/>
-            <a:r>
-              <a:rPr lang="en-US" dirty="0" smtClean="0"/>
-              <a:t>Validation</a:t>
-            </a:r>
-          </a:p>
-          <a:p>
-            <a:endParaRPr lang="en-US" dirty="0" smtClean="0"/>
-          </a:p>
-          <a:p>
-            <a:r>
-              <a:rPr lang="en-US" dirty="0" smtClean="0"/>
-              <a:t>Testing?</a:t>
-            </a:r>
-          </a:p>
-          <a:p>
+              <a:t>Beschreibung</a:t>
+            </a:r>
+            <a:r>
+              <a:rPr lang="en-US" baseline="0" dirty="0" smtClean="0"/>
+              <a:t> von Live Patching (</a:t>
+            </a:r>
+            <a:r>
+              <a:rPr lang="en-US" baseline="0" dirty="0" err="1" smtClean="0"/>
+              <a:t>kpatch</a:t>
+            </a:r>
+            <a:r>
+              <a:rPr lang="en-US" baseline="0" dirty="0" smtClean="0"/>
+              <a:t>)</a:t>
+            </a:r>
             <a:endParaRPr lang="en-US" dirty="0"/>
           </a:p>
         </p:txBody>
@@ -1759,237 +1594,6 @@
           <a:bodyPr/>
           <a:lstStyle/>
           <a:p>
-            <a:fld id="{0FB5C38E-1634-47E6-8404-50CF48BE15D5}" type="datetime1">
-              <a:rPr lang="en-US" smtClean="0"/>
-              <a:t>12/17/2015</a:t>
-            </a:fld>
-            <a:endParaRPr lang="en-US" dirty="0"/>
-          </a:p>
-        </p:txBody>
-      </p:sp>
-      <p:sp>
-        <p:nvSpPr>
-          <p:cNvPr id="7" name="Slide Number Placeholder 6"/>
-          <p:cNvSpPr>
-            <a:spLocks noGrp="1"/>
-          </p:cNvSpPr>
-          <p:nvPr>
-            <p:ph type="sldNum" sz="quarter" idx="13"/>
-          </p:nvPr>
-        </p:nvSpPr>
-        <p:spPr/>
-        <p:txBody>
-          <a:bodyPr/>
-          <a:lstStyle/>
-          <a:p>
-            <a:fld id="{B4008EB6-D09E-4580-8CD6-DDB14511944F}" type="slidenum">
-              <a:rPr lang="en-US" smtClean="0"/>
-              <a:pPr/>
-              <a:t>4</a:t>
-            </a:fld>
-            <a:endParaRPr lang="en-US" dirty="0"/>
-          </a:p>
-        </p:txBody>
-      </p:sp>
-    </p:spTree>
-    <p:extLst>
-      <p:ext uri="{BB962C8B-B14F-4D97-AF65-F5344CB8AC3E}">
-        <p14:creationId xmlns:p14="http://schemas.microsoft.com/office/powerpoint/2010/main" val="121312355"/>
-      </p:ext>
-    </p:extLst>
-  </p:cSld>
-  <p:clrMapOvr>
-    <a:masterClrMapping/>
-  </p:clrMapOvr>
-</p:notes>
-</file>
-
-<file path=ppt/notesSlides/notesSlide4.xml><?xml version="1.0" encoding="utf-8"?>
-<p:notes xmlns:a="http://schemas.openxmlformats.org/drawingml/2006/main" xmlns:r="http://schemas.openxmlformats.org/officeDocument/2006/relationships" xmlns:p="http://schemas.openxmlformats.org/presentationml/2006/main">
-  <p:cSld>
-    <p:spTree>
-      <p:nvGrpSpPr>
-        <p:cNvPr id="1" name=""/>
-        <p:cNvGrpSpPr/>
-        <p:nvPr/>
-      </p:nvGrpSpPr>
-      <p:grpSpPr>
-        <a:xfrm>
-          <a:off x="0" y="0"/>
-          <a:ext cx="0" cy="0"/>
-          <a:chOff x="0" y="0"/>
-          <a:chExt cx="0" cy="0"/>
-        </a:xfrm>
-      </p:grpSpPr>
-      <p:sp>
-        <p:nvSpPr>
-          <p:cNvPr id="2" name="Slide Image Placeholder 1"/>
-          <p:cNvSpPr>
-            <a:spLocks noGrp="1" noRot="1" noChangeAspect="1"/>
-          </p:cNvSpPr>
-          <p:nvPr>
-            <p:ph type="sldImg"/>
-          </p:nvPr>
-        </p:nvSpPr>
-        <p:spPr/>
-      </p:sp>
-      <p:sp>
-        <p:nvSpPr>
-          <p:cNvPr id="3" name="Notes Placeholder 2"/>
-          <p:cNvSpPr>
-            <a:spLocks noGrp="1"/>
-          </p:cNvSpPr>
-          <p:nvPr>
-            <p:ph type="body" idx="1"/>
-          </p:nvPr>
-        </p:nvSpPr>
-        <p:spPr/>
-        <p:txBody>
-          <a:bodyPr/>
-          <a:lstStyle/>
-          <a:p>
-            <a:r>
-              <a:rPr lang="en-US" dirty="0" err="1" smtClean="0"/>
-              <a:t>Kurze</a:t>
-            </a:r>
-            <a:r>
-              <a:rPr lang="en-US" dirty="0" smtClean="0"/>
-              <a:t> </a:t>
-            </a:r>
-            <a:r>
-              <a:rPr lang="en-US" dirty="0" err="1" smtClean="0"/>
-              <a:t>Beschreibung</a:t>
-            </a:r>
-            <a:r>
-              <a:rPr lang="en-US" baseline="0" dirty="0" smtClean="0"/>
-              <a:t> von Live Patching (</a:t>
-            </a:r>
-            <a:r>
-              <a:rPr lang="en-US" baseline="0" dirty="0" err="1" smtClean="0"/>
-              <a:t>kpatch</a:t>
-            </a:r>
-            <a:r>
-              <a:rPr lang="en-US" baseline="0" dirty="0" smtClean="0"/>
-              <a:t>)</a:t>
-            </a:r>
-            <a:endParaRPr lang="en-US" dirty="0"/>
-          </a:p>
-        </p:txBody>
-      </p:sp>
-      <p:sp>
-        <p:nvSpPr>
-          <p:cNvPr id="4" name="Header Placeholder 3"/>
-          <p:cNvSpPr>
-            <a:spLocks noGrp="1"/>
-          </p:cNvSpPr>
-          <p:nvPr>
-            <p:ph type="hdr" sz="quarter" idx="10"/>
-          </p:nvPr>
-        </p:nvSpPr>
-        <p:spPr/>
-        <p:txBody>
-          <a:bodyPr/>
-          <a:lstStyle/>
-          <a:p>
-            <a:r>
-              <a:rPr lang="en-US" smtClean="0"/>
-              <a:t>Build 2013</a:t>
-            </a:r>
-            <a:endParaRPr lang="en-US" dirty="0"/>
-          </a:p>
-        </p:txBody>
-      </p:sp>
-      <p:sp>
-        <p:nvSpPr>
-          <p:cNvPr id="5" name="Footer Placeholder 4"/>
-          <p:cNvSpPr>
-            <a:spLocks noGrp="1"/>
-          </p:cNvSpPr>
-          <p:nvPr>
-            <p:ph type="ftr" sz="quarter" idx="11"/>
-          </p:nvPr>
-        </p:nvSpPr>
-        <p:spPr/>
-        <p:txBody>
-          <a:bodyPr/>
-          <a:lstStyle/>
-          <a:p>
-            <a:pPr defTabSz="914099" eaLnBrk="0" hangingPunct="0"/>
-            <a:r>
-              <a:rPr lang="en-US" sz="400" smtClean="0">
-                <a:gradFill>
-                  <a:gsLst>
-                    <a:gs pos="0">
-                      <a:prstClr val="black"/>
-                    </a:gs>
-                    <a:gs pos="100000">
-                      <a:prstClr val="black"/>
-                    </a:gs>
-                  </a:gsLst>
-                  <a:lin ang="5400000" scaled="0"/>
-                </a:gradFill>
-                <a:latin typeface="Segoe UI" pitchFamily="34" charset="0"/>
-                <a:ea typeface="Segoe UI" pitchFamily="34" charset="0"/>
-                <a:cs typeface="Segoe UI" pitchFamily="34" charset="0"/>
-              </a:rPr>
-              <a:t>© 2013 Microsoft Corporation. All rights reserved. Microsoft, Windows, and other product names are or may be registered trademarks and/or trademarks in the U.S. and/or other countries.</a:t>
-            </a:r>
-          </a:p>
-          <a:p>
-            <a:pPr defTabSz="914099" eaLnBrk="0" hangingPunct="0"/>
-            <a:r>
-              <a:rPr lang="en-US" sz="400" smtClean="0">
-                <a:gradFill>
-                  <a:gsLst>
-                    <a:gs pos="0">
-                      <a:prstClr val="black"/>
-                    </a:gs>
-                    <a:gs pos="100000">
-                      <a:prstClr val="black"/>
-                    </a:gs>
-                  </a:gsLst>
-                  <a:lin ang="5400000" scaled="0"/>
-                </a:gradFill>
-                <a:latin typeface="Segoe UI" pitchFamily="34" charset="0"/>
-                <a:ea typeface="Segoe UI" pitchFamily="34" charset="0"/>
-                <a:cs typeface="Segoe UI" pitchFamily="34" charset="0"/>
-              </a:rPr>
-              <a:t>The information herein is for informational purposes only and represents the current view of Microsoft Corporation as of the date of this presentation. Because Microsoft must respond to changing market conditions, it should not be interpreted to be a commitment on the part of Microsoft, and Microsoft cannot guarantee the accuracy of any information provided after the date of this presentation. MICROSOFT MAKES NO WARRANTIES, EXPRESS, IMPLIED OR STATUTORY, AS TO THE INFORMATION IN THIS PRESENTATION.</a:t>
-            </a:r>
-            <a:endParaRPr lang="en-US" sz="400" dirty="0" smtClean="0">
-              <a:gradFill>
-                <a:gsLst>
-                  <a:gs pos="0">
-                    <a:prstClr val="black"/>
-                  </a:gs>
-                  <a:gs pos="100000">
-                    <a:prstClr val="black"/>
-                  </a:gs>
-                </a:gsLst>
-                <a:lin ang="5400000" scaled="0"/>
-              </a:gradFill>
-              <a:latin typeface="Segoe UI" pitchFamily="34" charset="0"/>
-              <a:ea typeface="Segoe UI" pitchFamily="34" charset="0"/>
-              <a:cs typeface="Segoe UI" pitchFamily="34" charset="0"/>
-            </a:endParaRPr>
-          </a:p>
-        </p:txBody>
-      </p:sp>
-      <p:sp>
-        <p:nvSpPr>
-          <p:cNvPr id="6" name="Date Placeholder 5"/>
-          <p:cNvSpPr>
-            <a:spLocks noGrp="1"/>
-          </p:cNvSpPr>
-          <p:nvPr>
-            <p:ph type="dt" idx="12"/>
-          </p:nvPr>
-        </p:nvSpPr>
-        <p:spPr/>
-        <p:txBody>
-          <a:bodyPr/>
-          <a:lstStyle/>
-          <a:p>
             <a:fld id="{DA341ACA-AFEC-4CF2-88DA-120F7DBFAA76}" type="datetime1">
               <a:rPr lang="en-US" smtClean="0"/>
               <a:t>12/17/2015</a:t>
@@ -2016,7 +1620,7 @@
             <a:fld id="{B4008EB6-D09E-4580-8CD6-DDB14511944F}" type="slidenum">
               <a:rPr lang="en-US" smtClean="0"/>
               <a:pPr/>
-              <a:t>5</a:t>
+              <a:t>4</a:t>
             </a:fld>
             <a:endParaRPr lang="en-US" dirty="0"/>
           </a:p>
@@ -2358,7 +1962,7 @@
   </p:timing>
   <p:extLst mod="1">
     <p:ext uri="{DCECCB84-F9BA-43D5-87BE-67443E8EF086}">
-      <p15:sldGuideLst xmlns:p15="http://schemas.microsoft.com/office/powerpoint/2012/main" xmlns=""/>
+      <p15:sldGuideLst xmlns="" xmlns:p15="http://schemas.microsoft.com/office/powerpoint/2012/main"/>
     </p:ext>
   </p:extLst>
 </p:sldLayout>
@@ -3201,7 +2805,7 @@
   </p:timing>
   <p:extLst mod="1">
     <p:ext uri="{DCECCB84-F9BA-43D5-87BE-67443E8EF086}">
-      <p15:sldGuideLst xmlns:p15="http://schemas.microsoft.com/office/powerpoint/2012/main" xmlns="">
+      <p15:sldGuideLst xmlns="" xmlns:p15="http://schemas.microsoft.com/office/powerpoint/2012/main">
         <p15:guide id="1" orient="horz" pos="1051" userDrawn="1">
           <p15:clr>
             <a:srgbClr val="FBAE40"/>
@@ -3754,7 +3358,7 @@
   </p:timing>
   <p:extLst mod="1">
     <p:ext uri="{DCECCB84-F9BA-43D5-87BE-67443E8EF086}">
-      <p15:sldGuideLst xmlns:p15="http://schemas.microsoft.com/office/powerpoint/2012/main" xmlns="">
+      <p15:sldGuideLst xmlns="" xmlns:p15="http://schemas.microsoft.com/office/powerpoint/2012/main">
         <p15:guide id="1" orient="horz" pos="1051" userDrawn="1">
           <p15:clr>
             <a:srgbClr val="FBAE40"/>
@@ -5120,9 +4724,14 @@
           <a:lstStyle/>
           <a:p>
             <a:r>
-              <a:rPr lang="en-US" dirty="0"/>
-              <a:t>Requirements Engineering</a:t>
-            </a:r>
+              <a:rPr lang="en-US" dirty="0" smtClean="0"/>
+              <a:t>Requirements </a:t>
+            </a:r>
+            <a:r>
+              <a:rPr lang="en-US" dirty="0" smtClean="0"/>
+              <a:t>Engineering</a:t>
+            </a:r>
+            <a:endParaRPr lang="en-US" dirty="0"/>
           </a:p>
         </p:txBody>
       </p:sp>
@@ -5141,13 +4750,199 @@
           <a:bodyPr/>
           <a:lstStyle/>
           <a:p>
-            <a:pPr marL="285750" lvl="1" indent="-285750">
-              <a:buFont typeface="Arial" panose="020B0604020202020204" pitchFamily="34" charset="0"/>
-              <a:buChar char="•"/>
+            <a:pPr marL="457200" lvl="1" indent="-457200">
+              <a:buClr>
+                <a:schemeClr val="accent6">
+                  <a:lumMod val="60000"/>
+                  <a:lumOff val="40000"/>
+                </a:schemeClr>
+              </a:buClr>
+              <a:buFont typeface="Wingdings" panose="05000000000000000000" pitchFamily="2" charset="2"/>
+              <a:buChar char="§"/>
             </a:pPr>
             <a:r>
               <a:rPr lang="en-US" dirty="0" smtClean="0"/>
-              <a:t>RE by external parties</a:t>
+              <a:t>No explicit RE</a:t>
+            </a:r>
+          </a:p>
+          <a:p>
+            <a:pPr marL="914282" lvl="2" indent="-457200">
+              <a:buClr>
+                <a:schemeClr val="accent6">
+                  <a:lumMod val="60000"/>
+                  <a:lumOff val="40000"/>
+                </a:schemeClr>
+              </a:buClr>
+              <a:buFont typeface="Segoe UI" panose="020B0502040204020203" pitchFamily="34" charset="0"/>
+              <a:buChar char="»"/>
+            </a:pPr>
+            <a:r>
+              <a:rPr lang="en-US" dirty="0" smtClean="0"/>
+              <a:t>No plans for future releases &amp; rejection of fixed interfaces</a:t>
+            </a:r>
+          </a:p>
+          <a:p>
+            <a:pPr marL="457200" lvl="1" indent="-457200">
+              <a:buClr>
+                <a:schemeClr val="accent6">
+                  <a:lumMod val="60000"/>
+                  <a:lumOff val="40000"/>
+                </a:schemeClr>
+              </a:buClr>
+              <a:buFont typeface="Wingdings" panose="05000000000000000000" pitchFamily="2" charset="2"/>
+              <a:buChar char="§"/>
+            </a:pPr>
+            <a:r>
+              <a:rPr lang="en-US" dirty="0" smtClean="0"/>
+              <a:t>RE as a mix of community needs and quality control</a:t>
+            </a:r>
+          </a:p>
+          <a:p>
+            <a:pPr marL="799982" lvl="2" indent="-342900">
+              <a:buClr>
+                <a:schemeClr val="accent6">
+                  <a:lumMod val="60000"/>
+                  <a:lumOff val="40000"/>
+                </a:schemeClr>
+              </a:buClr>
+              <a:buFont typeface="Segoe UI" panose="020B0502040204020203" pitchFamily="34" charset="0"/>
+              <a:buChar char="»"/>
+            </a:pPr>
+            <a:r>
+              <a:rPr lang="en-US" dirty="0" smtClean="0"/>
+              <a:t>community </a:t>
+            </a:r>
+            <a:r>
+              <a:rPr lang="en-US" dirty="0"/>
+              <a:t>provides input and implementations (unstructured)</a:t>
+            </a:r>
+          </a:p>
+          <a:p>
+            <a:pPr marL="799982" lvl="2" indent="-342900">
+              <a:buClr>
+                <a:schemeClr val="accent6">
+                  <a:lumMod val="60000"/>
+                  <a:lumOff val="40000"/>
+                </a:schemeClr>
+              </a:buClr>
+              <a:buFont typeface="Segoe UI" panose="020B0502040204020203" pitchFamily="34" charset="0"/>
+              <a:buChar char="»"/>
+            </a:pPr>
+            <a:r>
+              <a:rPr lang="en-US" dirty="0" smtClean="0"/>
+              <a:t> </a:t>
+            </a:r>
+            <a:r>
+              <a:rPr lang="en-US" dirty="0"/>
+              <a:t>maintainers </a:t>
+            </a:r>
+            <a:r>
+              <a:rPr lang="en-US" dirty="0" smtClean="0"/>
+              <a:t>perform </a:t>
+            </a:r>
+            <a:r>
+              <a:rPr lang="en-US" dirty="0"/>
+              <a:t>strict Quality </a:t>
+            </a:r>
+            <a:r>
+              <a:rPr lang="en-US" dirty="0" smtClean="0"/>
+              <a:t>Control</a:t>
+            </a:r>
+          </a:p>
+          <a:p>
+            <a:pPr marL="457200" lvl="1" indent="-457200">
+              <a:buClr>
+                <a:schemeClr val="accent6">
+                  <a:lumMod val="60000"/>
+                  <a:lumOff val="40000"/>
+                </a:schemeClr>
+              </a:buClr>
+              <a:buFont typeface="Wingdings" panose="05000000000000000000" pitchFamily="2" charset="2"/>
+              <a:buChar char="§"/>
+            </a:pPr>
+            <a:r>
+              <a:rPr lang="en-US" dirty="0"/>
+              <a:t>Quality Control as a </a:t>
+            </a:r>
+            <a:r>
+              <a:rPr lang="en-US" dirty="0" smtClean="0"/>
+              <a:t>workflow</a:t>
+            </a:r>
+          </a:p>
+          <a:p>
+            <a:pPr marL="799982" lvl="2" indent="-342900">
+              <a:buClr>
+                <a:schemeClr val="accent6">
+                  <a:lumMod val="60000"/>
+                  <a:lumOff val="40000"/>
+                </a:schemeClr>
+              </a:buClr>
+              <a:buFont typeface="Segoe UI" panose="020B0502040204020203" pitchFamily="34" charset="0"/>
+              <a:buChar char="»"/>
+            </a:pPr>
+            <a:r>
+              <a:rPr lang="en-US" dirty="0"/>
+              <a:t>very strict and hierarchical workflow</a:t>
+            </a:r>
+          </a:p>
+          <a:p>
+            <a:pPr marL="799982" lvl="2" indent="-342900">
+              <a:buClr>
+                <a:schemeClr val="accent6">
+                  <a:lumMod val="60000"/>
+                  <a:lumOff val="40000"/>
+                </a:schemeClr>
+              </a:buClr>
+              <a:buFont typeface="Segoe UI" panose="020B0502040204020203" pitchFamily="34" charset="0"/>
+              <a:buChar char="»"/>
+            </a:pPr>
+            <a:r>
+              <a:rPr lang="en-US" dirty="0" smtClean="0"/>
+              <a:t>every </a:t>
+            </a:r>
+            <a:r>
+              <a:rPr lang="en-US" dirty="0"/>
+              <a:t>step includes Quality Control</a:t>
+            </a:r>
+          </a:p>
+          <a:p>
+            <a:pPr marL="799982" lvl="2" indent="-342900">
+              <a:buClr>
+                <a:schemeClr val="accent6">
+                  <a:lumMod val="60000"/>
+                  <a:lumOff val="40000"/>
+                </a:schemeClr>
+              </a:buClr>
+              <a:buFont typeface="Segoe UI" panose="020B0502040204020203" pitchFamily="34" charset="0"/>
+              <a:buChar char="»"/>
+            </a:pPr>
+            <a:r>
+              <a:rPr lang="en-US" dirty="0" smtClean="0"/>
+              <a:t>actual </a:t>
+            </a:r>
+            <a:r>
+              <a:rPr lang="en-US" dirty="0"/>
+              <a:t>Quality Control is assured by taking personal </a:t>
+            </a:r>
+            <a:r>
+              <a:rPr lang="en-US" dirty="0" smtClean="0"/>
+              <a:t>responsibility</a:t>
+            </a:r>
+          </a:p>
+          <a:p>
+            <a:pPr marL="457200" lvl="1" indent="-457200">
+              <a:buClr>
+                <a:schemeClr val="accent6">
+                  <a:lumMod val="60000"/>
+                  <a:lumOff val="40000"/>
+                </a:schemeClr>
+              </a:buClr>
+              <a:buFont typeface="Wingdings" panose="05000000000000000000" pitchFamily="2" charset="2"/>
+              <a:buChar char="§"/>
+            </a:pPr>
+            <a:r>
+              <a:rPr lang="en-US" dirty="0"/>
+              <a:t>TODO: Implications and historical development</a:t>
             </a:r>
           </a:p>
         </p:txBody>
@@ -5168,8 +4963,16 @@
           <a:lstStyle/>
           <a:p>
             <a:r>
-              <a:rPr lang="de-DE" smtClean="0"/>
-              <a:t>Linux Kernel - Requirements und Architektur</a:t>
+              <a:rPr lang="de-DE" dirty="0" smtClean="0"/>
+              <a:t>Linux Kernel - </a:t>
+            </a:r>
+            <a:r>
+              <a:rPr lang="de-DE" dirty="0" err="1" smtClean="0"/>
+              <a:t>Requirements</a:t>
+            </a:r>
+            <a:r>
+              <a:rPr lang="de-DE" dirty="0" smtClean="0"/>
+              <a:t> und Architektur</a:t>
             </a:r>
             <a:endParaRPr lang="en-US" dirty="0"/>
           </a:p>
@@ -5202,7 +5005,7 @@
     </p:spTree>
     <p:extLst>
       <p:ext uri="{BB962C8B-B14F-4D97-AF65-F5344CB8AC3E}">
-        <p14:creationId xmlns:p14="http://schemas.microsoft.com/office/powerpoint/2010/main" val="260831835"/>
+        <p14:creationId xmlns:p14="http://schemas.microsoft.com/office/powerpoint/2010/main" val="150764829"/>
       </p:ext>
     </p:extLst>
   </p:cSld>
@@ -5250,7 +5053,7 @@
       </p:grpSpPr>
       <p:sp>
         <p:nvSpPr>
-          <p:cNvPr id="9" name="Title 8"/>
+          <p:cNvPr id="2" name="Title 1"/>
           <p:cNvSpPr>
             <a:spLocks noGrp="1"/>
           </p:cNvSpPr>
@@ -5265,7 +5068,7 @@
           <a:p>
             <a:r>
               <a:rPr lang="en-US" dirty="0" smtClean="0"/>
-              <a:t>Requirements Engineering – Community RE</a:t>
+              <a:t>Architecture</a:t>
             </a:r>
             <a:endParaRPr lang="en-US" dirty="0"/>
           </a:p>
@@ -5286,201 +5089,94 @@
           <a:bodyPr/>
           <a:lstStyle/>
           <a:p>
-            <a:pPr marL="457200" lvl="1" indent="-457200">
-              <a:buClr>
-                <a:schemeClr val="accent6">
-                  <a:lumMod val="60000"/>
-                  <a:lumOff val="40000"/>
-                </a:schemeClr>
-              </a:buClr>
-              <a:buFont typeface="Wingdings" panose="05000000000000000000" pitchFamily="2" charset="2"/>
-              <a:buChar char="§"/>
-            </a:pPr>
-            <a:r>
-              <a:rPr lang="en-US" dirty="0" smtClean="0"/>
-              <a:t>No explicit RE</a:t>
-            </a:r>
-          </a:p>
-          <a:p>
-            <a:pPr marL="914282" lvl="2" indent="-457200">
-              <a:buClr>
-                <a:schemeClr val="accent6">
-                  <a:lumMod val="60000"/>
-                  <a:lumOff val="40000"/>
-                </a:schemeClr>
-              </a:buClr>
-              <a:buFont typeface="Segoe UI" panose="020B0502040204020203" pitchFamily="34" charset="0"/>
-              <a:buChar char="»"/>
-            </a:pPr>
-            <a:r>
-              <a:rPr lang="en-US" dirty="0" smtClean="0"/>
-              <a:t>No plans for future releases &amp; rejection of fixed interfaces</a:t>
-            </a:r>
-          </a:p>
-          <a:p>
-            <a:pPr marL="457200" lvl="1" indent="-457200">
-              <a:buClr>
-                <a:schemeClr val="accent6">
-                  <a:lumMod val="60000"/>
-                  <a:lumOff val="40000"/>
-                </a:schemeClr>
-              </a:buClr>
-              <a:buFont typeface="Wingdings" panose="05000000000000000000" pitchFamily="2" charset="2"/>
-              <a:buChar char="§"/>
-            </a:pPr>
-            <a:r>
-              <a:rPr lang="en-US" dirty="0" smtClean="0"/>
-              <a:t>RE as a mix of community needs and quality control</a:t>
-            </a:r>
-          </a:p>
-          <a:p>
-            <a:pPr marL="799982" lvl="2" indent="-342900">
-              <a:buClr>
-                <a:schemeClr val="accent6">
-                  <a:lumMod val="60000"/>
-                  <a:lumOff val="40000"/>
-                </a:schemeClr>
-              </a:buClr>
-              <a:buFont typeface="Segoe UI" panose="020B0502040204020203" pitchFamily="34" charset="0"/>
-              <a:buChar char="»"/>
-            </a:pPr>
-            <a:r>
-              <a:rPr lang="en-US" dirty="0" smtClean="0"/>
-              <a:t>community </a:t>
-            </a:r>
-            <a:r>
-              <a:rPr lang="en-US" dirty="0"/>
-              <a:t>provides input and implementations (unstructured)</a:t>
-            </a:r>
-          </a:p>
-          <a:p>
-            <a:pPr marL="799982" lvl="2" indent="-342900">
-              <a:buClr>
-                <a:schemeClr val="accent6">
-                  <a:lumMod val="60000"/>
-                  <a:lumOff val="40000"/>
-                </a:schemeClr>
-              </a:buClr>
-              <a:buFont typeface="Segoe UI" panose="020B0502040204020203" pitchFamily="34" charset="0"/>
-              <a:buChar char="»"/>
-            </a:pPr>
-            <a:r>
-              <a:rPr lang="en-US" dirty="0" smtClean="0"/>
-              <a:t> </a:t>
-            </a:r>
-            <a:r>
-              <a:rPr lang="en-US" dirty="0"/>
-              <a:t>maintainers </a:t>
-            </a:r>
-            <a:r>
-              <a:rPr lang="en-US" dirty="0" smtClean="0"/>
-              <a:t>perform </a:t>
-            </a:r>
-            <a:r>
-              <a:rPr lang="en-US" dirty="0"/>
-              <a:t>strict Quality </a:t>
-            </a:r>
-            <a:r>
-              <a:rPr lang="en-US" dirty="0" smtClean="0"/>
-              <a:t>Control</a:t>
-            </a:r>
-          </a:p>
-          <a:p>
-            <a:pPr marL="457200" lvl="1" indent="-457200">
-              <a:buClr>
-                <a:schemeClr val="accent6">
-                  <a:lumMod val="60000"/>
-                  <a:lumOff val="40000"/>
-                </a:schemeClr>
-              </a:buClr>
-              <a:buFont typeface="Wingdings" panose="05000000000000000000" pitchFamily="2" charset="2"/>
-              <a:buChar char="§"/>
-            </a:pPr>
-            <a:r>
-              <a:rPr lang="en-US" dirty="0"/>
-              <a:t>Quality Control as a </a:t>
-            </a:r>
-            <a:r>
-              <a:rPr lang="en-US" dirty="0" smtClean="0"/>
-              <a:t>workflow</a:t>
-            </a:r>
-          </a:p>
-          <a:p>
-            <a:pPr marL="799982" lvl="2" indent="-342900">
-              <a:buClr>
-                <a:schemeClr val="accent6">
-                  <a:lumMod val="60000"/>
-                  <a:lumOff val="40000"/>
-                </a:schemeClr>
-              </a:buClr>
-              <a:buFont typeface="Segoe UI" panose="020B0502040204020203" pitchFamily="34" charset="0"/>
-              <a:buChar char="»"/>
-            </a:pPr>
-            <a:r>
-              <a:rPr lang="en-US" dirty="0"/>
-              <a:t>very strict and hierarchical workflow</a:t>
-            </a:r>
-          </a:p>
-          <a:p>
-            <a:pPr marL="799982" lvl="2" indent="-342900">
-              <a:buClr>
-                <a:schemeClr val="accent6">
-                  <a:lumMod val="60000"/>
-                  <a:lumOff val="40000"/>
-                </a:schemeClr>
-              </a:buClr>
-              <a:buFont typeface="Segoe UI" panose="020B0502040204020203" pitchFamily="34" charset="0"/>
-              <a:buChar char="»"/>
-            </a:pPr>
-            <a:r>
-              <a:rPr lang="en-US" dirty="0" smtClean="0"/>
-              <a:t>every </a:t>
-            </a:r>
-            <a:r>
-              <a:rPr lang="en-US" dirty="0"/>
-              <a:t>step includes Quality Control</a:t>
-            </a:r>
-          </a:p>
-          <a:p>
-            <a:pPr marL="799982" lvl="2" indent="-342900">
-              <a:buClr>
-                <a:schemeClr val="accent6">
-                  <a:lumMod val="60000"/>
-                  <a:lumOff val="40000"/>
-                </a:schemeClr>
-              </a:buClr>
-              <a:buFont typeface="Segoe UI" panose="020B0502040204020203" pitchFamily="34" charset="0"/>
-              <a:buChar char="»"/>
-            </a:pPr>
-            <a:r>
-              <a:rPr lang="en-US" dirty="0" smtClean="0"/>
-              <a:t>actual </a:t>
-            </a:r>
-            <a:r>
-              <a:rPr lang="en-US" dirty="0"/>
-              <a:t>Quality Control is assured by taking personal </a:t>
-            </a:r>
-            <a:r>
-              <a:rPr lang="en-US" dirty="0" smtClean="0"/>
-              <a:t>responsibility</a:t>
-            </a:r>
-          </a:p>
-          <a:p>
-            <a:pPr marL="457200" lvl="1" indent="-457200">
-              <a:buClr>
-                <a:schemeClr val="accent6">
-                  <a:lumMod val="60000"/>
-                  <a:lumOff val="40000"/>
-                </a:schemeClr>
-              </a:buClr>
-              <a:buFont typeface="Wingdings" panose="05000000000000000000" pitchFamily="2" charset="2"/>
-              <a:buChar char="§"/>
-            </a:pPr>
-            <a:r>
-              <a:rPr lang="en-US" dirty="0"/>
-              <a:t>TODO: Implications and historical development</a:t>
-            </a:r>
-            <a:endParaRPr lang="en-US" dirty="0"/>
+            <a:pPr lvl="2"/>
+            <a:r>
+              <a:rPr lang="en-US" sz="2800" dirty="0" smtClean="0"/>
+              <a:t>Description of the high-level architecture</a:t>
+            </a:r>
+          </a:p>
+          <a:p>
+            <a:pPr lvl="2"/>
+            <a:r>
+              <a:rPr lang="en-US" sz="2800" dirty="0" smtClean="0"/>
+              <a:t>Linux as a product line</a:t>
+            </a:r>
+          </a:p>
+          <a:p>
+            <a:pPr lvl="4"/>
+            <a:r>
+              <a:rPr lang="en-US" dirty="0" smtClean="0"/>
+              <a:t>How it is done</a:t>
+            </a:r>
+          </a:p>
+          <a:p>
+            <a:pPr lvl="4"/>
+            <a:r>
+              <a:rPr lang="en-US" dirty="0" smtClean="0"/>
+              <a:t>Pros &amp; Cons of the used approach (TBD)</a:t>
+            </a:r>
+          </a:p>
+          <a:p>
+            <a:pPr lvl="2"/>
+            <a:r>
+              <a:rPr lang="en-US" sz="2800" dirty="0" smtClean="0"/>
+              <a:t>Focus on LKMs(Loadable Kernel Modules)</a:t>
+            </a:r>
+          </a:p>
+          <a:p>
+            <a:pPr lvl="4"/>
+            <a:r>
+              <a:rPr lang="en-US" dirty="0" smtClean="0"/>
+              <a:t>Load/Unload Mechanism</a:t>
+            </a:r>
+          </a:p>
+          <a:p>
+            <a:pPr lvl="4"/>
+            <a:r>
+              <a:rPr lang="en-US" dirty="0" smtClean="0"/>
+              <a:t> Architectural design for module abstraction (TBD)</a:t>
+            </a:r>
+          </a:p>
+          <a:p>
+            <a:pPr lvl="2"/>
+            <a:r>
+              <a:rPr lang="en-US" sz="2800" dirty="0" smtClean="0"/>
+              <a:t>Analysis of a specific module: Linux </a:t>
+            </a:r>
+            <a:r>
+              <a:rPr lang="en-US" sz="2800" dirty="0" err="1" smtClean="0"/>
+              <a:t>Livepatching</a:t>
+            </a:r>
+            <a:endParaRPr lang="en-US" sz="2800" dirty="0" smtClean="0"/>
+          </a:p>
+          <a:p>
+            <a:pPr lvl="4"/>
+            <a:r>
+              <a:rPr lang="en-US" dirty="0" smtClean="0"/>
+              <a:t>General functionality</a:t>
+            </a:r>
+          </a:p>
+          <a:p>
+            <a:pPr lvl="4"/>
+            <a:r>
+              <a:rPr lang="en-US" dirty="0" smtClean="0"/>
+              <a:t>Code-Analysis with tools</a:t>
+            </a:r>
+          </a:p>
+          <a:p>
+            <a:pPr lvl="2"/>
+            <a:r>
+              <a:rPr lang="en-US" sz="2800" dirty="0" smtClean="0"/>
+              <a:t>Analysis of another module/kernel functionality (TBD)</a:t>
+            </a:r>
+          </a:p>
+          <a:p>
+            <a:pPr lvl="2"/>
+            <a:endParaRPr lang="en-US" sz="2800" dirty="0" smtClean="0"/>
+          </a:p>
+          <a:p>
+            <a:pPr lvl="2"/>
+            <a:endParaRPr lang="en-US" sz="2800" dirty="0" smtClean="0"/>
           </a:p>
         </p:txBody>
       </p:sp>
@@ -5500,20 +5196,8 @@
           <a:lstStyle/>
           <a:p>
             <a:r>
-              <a:rPr lang="de-DE" dirty="0" smtClean="0"/>
-              <a:t>Linux Kernel - </a:t>
-            </a:r>
-            <a:r>
-              <a:rPr lang="de-DE" dirty="0" err="1" smtClean="0"/>
-              <a:t>Requirements</a:t>
-            </a:r>
-            <a:r>
-              <a:rPr lang="de-DE" dirty="0" smtClean="0"/>
-              <a:t> </a:t>
-            </a:r>
-            <a:r>
-              <a:rPr lang="de-DE" dirty="0" smtClean="0"/>
-              <a:t>und Architektur</a:t>
+              <a:rPr lang="de-DE" smtClean="0"/>
+              <a:t>Linux Kernel - Requirements und Architektur</a:t>
             </a:r>
             <a:endParaRPr lang="en-US" dirty="0"/>
           </a:p>
@@ -5538,239 +5222,6 @@
               <a:rPr lang="en-US" smtClean="0"/>
               <a:pPr/>
               <a:t>3</a:t>
-            </a:fld>
-            <a:endParaRPr lang="en-US"/>
-          </a:p>
-        </p:txBody>
-      </p:sp>
-    </p:spTree>
-    <p:extLst>
-      <p:ext uri="{BB962C8B-B14F-4D97-AF65-F5344CB8AC3E}">
-        <p14:creationId xmlns:p14="http://schemas.microsoft.com/office/powerpoint/2010/main" val="150764829"/>
-      </p:ext>
-    </p:extLst>
-  </p:cSld>
-  <p:clrMapOvr>
-    <a:masterClrMapping/>
-  </p:clrMapOvr>
-  <mc:AlternateContent xmlns:mc="http://schemas.openxmlformats.org/markup-compatibility/2006" xmlns:p14="http://schemas.microsoft.com/office/powerpoint/2010/main">
-    <mc:Choice Requires="p14">
-      <p:transition spd="med" p14:dur="700">
-        <p:fade/>
-      </p:transition>
-    </mc:Choice>
-    <mc:Fallback xmlns="">
-      <p:transition spd="med">
-        <p:fade/>
-      </p:transition>
-    </mc:Fallback>
-  </mc:AlternateContent>
-  <p:timing>
-    <p:tnLst>
-      <p:par>
-        <p:cTn id="1" dur="indefinite" restart="never" nodeType="tmRoot"/>
-      </p:par>
-    </p:tnLst>
-  </p:timing>
-</p:sld>
-</file>
-
-<file path=ppt/slides/slide4.xml><?xml version="1.0" encoding="utf-8"?>
-<p:sld xmlns:a="http://schemas.openxmlformats.org/drawingml/2006/main" xmlns:r="http://schemas.openxmlformats.org/officeDocument/2006/relationships" xmlns:p="http://schemas.openxmlformats.org/presentationml/2006/main">
-  <p:cSld>
-    <p:spTree>
-      <p:nvGrpSpPr>
-        <p:cNvPr id="1" name=""/>
-        <p:cNvGrpSpPr/>
-        <p:nvPr/>
-      </p:nvGrpSpPr>
-      <p:grpSpPr>
-        <a:xfrm>
-          <a:off x="0" y="0"/>
-          <a:ext cx="0" cy="0"/>
-          <a:chOff x="0" y="0"/>
-          <a:chExt cx="0" cy="0"/>
-        </a:xfrm>
-      </p:grpSpPr>
-      <p:sp>
-        <p:nvSpPr>
-          <p:cNvPr id="2" name="Title 1"/>
-          <p:cNvSpPr>
-            <a:spLocks noGrp="1"/>
-          </p:cNvSpPr>
-          <p:nvPr>
-            <p:ph type="title"/>
-          </p:nvPr>
-        </p:nvSpPr>
-        <p:spPr/>
-        <p:txBody>
-          <a:bodyPr/>
-          <a:lstStyle/>
-          <a:p>
-            <a:r>
-              <a:rPr lang="en-US" dirty="0" smtClean="0"/>
-              <a:t>Architecture</a:t>
-            </a:r>
-            <a:endParaRPr lang="en-US" dirty="0"/>
-          </a:p>
-        </p:txBody>
-      </p:sp>
-      <p:sp>
-        <p:nvSpPr>
-          <p:cNvPr id="3" name="Content Placeholder 2"/>
-          <p:cNvSpPr>
-            <a:spLocks noGrp="1"/>
-          </p:cNvSpPr>
-          <p:nvPr>
-            <p:ph sz="quarter" idx="15"/>
-          </p:nvPr>
-        </p:nvSpPr>
-        <p:spPr/>
-        <p:txBody>
-          <a:bodyPr/>
-          <a:lstStyle/>
-          <a:p>
-            <a:pPr lvl="2"/>
-            <a:r>
-              <a:rPr lang="en-US" sz="2800" dirty="0" smtClean="0"/>
-              <a:t>Description of the high-level architecture</a:t>
-            </a:r>
-          </a:p>
-          <a:p>
-            <a:pPr lvl="2"/>
-            <a:r>
-              <a:rPr lang="en-US" sz="2800" dirty="0" smtClean="0"/>
-              <a:t>Linux as a product line</a:t>
-            </a:r>
-          </a:p>
-          <a:p>
-            <a:pPr lvl="4"/>
-            <a:r>
-              <a:rPr lang="en-US" dirty="0" smtClean="0"/>
-              <a:t>How it is done</a:t>
-            </a:r>
-          </a:p>
-          <a:p>
-            <a:pPr lvl="4"/>
-            <a:r>
-              <a:rPr lang="en-US" dirty="0" smtClean="0"/>
-              <a:t>Pros &amp; Cons of the used approach (TBD)</a:t>
-            </a:r>
-          </a:p>
-          <a:p>
-            <a:pPr lvl="2"/>
-            <a:r>
-              <a:rPr lang="en-US" sz="2800" dirty="0" smtClean="0"/>
-              <a:t>Focus on LKMs(Loadable Kernel Modules)</a:t>
-            </a:r>
-          </a:p>
-          <a:p>
-            <a:pPr lvl="4"/>
-            <a:r>
-              <a:rPr lang="en-US" dirty="0" smtClean="0"/>
-              <a:t>Load/Unload Mechanism</a:t>
-            </a:r>
-          </a:p>
-          <a:p>
-            <a:pPr lvl="4"/>
-            <a:r>
-              <a:rPr lang="en-US" dirty="0" smtClean="0"/>
-              <a:t> Architectural design for module </a:t>
-            </a:r>
-            <a:r>
-              <a:rPr lang="en-US" dirty="0" smtClean="0"/>
-              <a:t>abstraction </a:t>
-            </a:r>
-            <a:r>
-              <a:rPr lang="en-US" dirty="0" smtClean="0"/>
-              <a:t>(TBD)</a:t>
-            </a:r>
-          </a:p>
-          <a:p>
-            <a:pPr lvl="2"/>
-            <a:r>
-              <a:rPr lang="en-US" sz="2800" dirty="0" smtClean="0"/>
-              <a:t>Analysis of a specific module: Linux </a:t>
-            </a:r>
-            <a:r>
-              <a:rPr lang="en-US" sz="2800" dirty="0" err="1" smtClean="0"/>
-              <a:t>Livepatching</a:t>
-            </a:r>
-            <a:endParaRPr lang="en-US" sz="2800" dirty="0" smtClean="0"/>
-          </a:p>
-          <a:p>
-            <a:pPr lvl="4"/>
-            <a:r>
-              <a:rPr lang="en-US" dirty="0" smtClean="0"/>
-              <a:t>General functionality</a:t>
-            </a:r>
-          </a:p>
-          <a:p>
-            <a:pPr lvl="4"/>
-            <a:r>
-              <a:rPr lang="en-US" dirty="0" smtClean="0"/>
-              <a:t>Code-Analysis with tools</a:t>
-            </a:r>
-          </a:p>
-          <a:p>
-            <a:pPr lvl="2"/>
-            <a:r>
-              <a:rPr lang="en-US" sz="2800" dirty="0" smtClean="0"/>
-              <a:t>Analysis of another module/kernel functionality (TBD)</a:t>
-            </a:r>
-          </a:p>
-          <a:p>
-            <a:pPr lvl="2"/>
-            <a:endParaRPr lang="en-US" sz="2800" dirty="0" smtClean="0"/>
-          </a:p>
-          <a:p>
-            <a:pPr lvl="2"/>
-            <a:endParaRPr lang="en-US" sz="2800" dirty="0" smtClean="0"/>
-          </a:p>
-        </p:txBody>
-      </p:sp>
-      <p:sp>
-        <p:nvSpPr>
-          <p:cNvPr id="4" name="Footer Placeholder 3"/>
-          <p:cNvSpPr>
-            <a:spLocks noGrp="1"/>
-          </p:cNvSpPr>
-          <p:nvPr>
-            <p:ph type="ftr" sz="quarter" idx="3"/>
-          </p:nvPr>
-        </p:nvSpPr>
-        <p:spPr/>
-        <p:txBody>
-          <a:bodyPr/>
-          <a:lstStyle/>
-          <a:p>
-            <a:r>
-              <a:rPr lang="de-DE" smtClean="0"/>
-              <a:t>Linux Kernel - Requirements und Architektur</a:t>
-            </a:r>
-            <a:endParaRPr lang="en-US" dirty="0"/>
-          </a:p>
-        </p:txBody>
-      </p:sp>
-      <p:sp>
-        <p:nvSpPr>
-          <p:cNvPr id="5" name="Slide Number Placeholder 4"/>
-          <p:cNvSpPr>
-            <a:spLocks noGrp="1"/>
-          </p:cNvSpPr>
-          <p:nvPr>
-            <p:ph type="sldNum" sz="quarter" idx="4"/>
-          </p:nvPr>
-        </p:nvSpPr>
-        <p:spPr/>
-        <p:txBody>
-          <a:bodyPr/>
-          <a:lstStyle/>
-          <a:p>
-            <a:fld id="{860CA8AD-EDD7-4639-9B75-4CED81BEA940}" type="slidenum">
-              <a:rPr lang="en-US" smtClean="0"/>
-              <a:pPr/>
-              <a:t>4</a:t>
             </a:fld>
             <a:endParaRPr lang="en-US"/>
           </a:p>
@@ -5801,7 +5252,7 @@
 </p:sld>
 </file>
 
-<file path=ppt/slides/slide5.xml><?xml version="1.0" encoding="utf-8"?>
+<file path=ppt/slides/slide4.xml><?xml version="1.0" encoding="utf-8"?>
 <p:sld xmlns:a="http://schemas.openxmlformats.org/drawingml/2006/main" xmlns:r="http://schemas.openxmlformats.org/officeDocument/2006/relationships" xmlns:p="http://schemas.openxmlformats.org/presentationml/2006/main">
   <p:cSld>
     <p:spTree>
@@ -6081,7 +5532,7 @@
             <a:fld id="{860CA8AD-EDD7-4639-9B75-4CED81BEA940}" type="slidenum">
               <a:rPr lang="en-US" smtClean="0"/>
               <a:pPr/>
-              <a:t>5</a:t>
+              <a:t>4</a:t>
             </a:fld>
             <a:endParaRPr lang="en-US"/>
           </a:p>
@@ -6415,7 +5866,7 @@
   <a:extraClrSchemeLst/>
   <a:extLst>
     <a:ext uri="{05A4C25C-085E-4340-85A3-A5531E510DB2}">
-      <thm15:themeFamily xmlns:thm15="http://schemas.microsoft.com/office/thememl/2012/main" xmlns="" name="Presentation2" id="{EDA29936-A025-40D4-ACF1-D3439BF362C4}" vid="{C0A284D5-5E63-4932-908B-AF95DB49F3A1}"/>
+      <thm15:themeFamily xmlns="" xmlns:thm15="http://schemas.microsoft.com/office/thememl/2012/main" name="Presentation2" id="{EDA29936-A025-40D4-ACF1-D3439BF362C4}" vid="{C0A284D5-5E63-4932-908B-AF95DB49F3A1}"/>
     </a:ext>
   </a:extLst>
 </a:theme>
@@ -6988,76 +6439,6 @@
 </file>
 
 <file path=customXml/item1.xml><?xml version="1.0" encoding="utf-8"?>
-<p:properties xmlns:p="http://schemas.microsoft.com/office/2006/metadata/properties" xmlns:xsi="http://www.w3.org/2001/XMLSchema-instance" xmlns:pc="http://schemas.microsoft.com/office/infopath/2007/PartnerControls">
-  <documentManagement>
-    <TrackTaxHTField0 xmlns="2295e2e7-0eeb-498e-8716-217bb2ee6ee3">
-      <Terms xmlns="http://schemas.microsoft.com/office/infopath/2007/PartnerControls"/>
-    </TrackTaxHTField0>
-    <CampaignTaxHTField0 xmlns="2295e2e7-0eeb-498e-8716-217bb2ee6ee3">
-      <Terms xmlns="http://schemas.microsoft.com/office/infopath/2007/PartnerControls"/>
-    </CampaignTaxHTField0>
-    <Event_x0020_End_x0020_Date xmlns="2295e2e7-0eeb-498e-8716-217bb2ee6ee3">2013-06-28T07:00:00+00:00</Event_x0020_End_x0020_Date>
-    <Event_x0020_Start_x0020_Date xmlns="2295e2e7-0eeb-498e-8716-217bb2ee6ee3">2013-06-26T07:00:00+00:00</Event_x0020_Start_x0020_Date>
-    <MS_x0020_Speaker xmlns="2295e2e7-0eeb-498e-8716-217bb2ee6ee3">
-      <UserInfo>
-        <DisplayName/>
-        <AccountId xsi:nil="true"/>
-        <AccountType/>
-      </UserInfo>
-    </MS_x0020_Speaker>
-    <External_x0020_Speaker xmlns="2295e2e7-0eeb-498e-8716-217bb2ee6ee3" xsi:nil="true"/>
-    <Session_x0020_Code xmlns="2295e2e7-0eeb-498e-8716-217bb2ee6ee3" xsi:nil="true"/>
-    <ProductTaxHTField0 xmlns="2295e2e7-0eeb-498e-8716-217bb2ee6ee3">
-      <Terms xmlns="http://schemas.microsoft.com/office/infopath/2007/PartnerControls"/>
-    </ProductTaxHTField0>
-    <Presentation_x0020_Date xmlns="2295e2e7-0eeb-498e-8716-217bb2ee6ee3">2013-06-26T00:00:00-07:00</Presentation_x0020_Date>
-    <Event_x0020_LocationTaxHTField0 xmlns="2295e2e7-0eeb-498e-8716-217bb2ee6ee3">
-      <Terms xmlns="http://schemas.microsoft.com/office/infopath/2007/PartnerControls">
-        <TermInfo xmlns="http://schemas.microsoft.com/office/infopath/2007/PartnerControls">
-          <TermName xmlns="http://schemas.microsoft.com/office/infopath/2007/PartnerControls">San Francisco</TermName>
-          <TermId xmlns="http://schemas.microsoft.com/office/infopath/2007/PartnerControls">84dfcb53-432b-499d-8965-93d483d36b4a</TermId>
-        </TermInfo>
-      </Terms>
-    </Event_x0020_LocationTaxHTField0>
-    <Event1TaxHTField0 xmlns="2295e2e7-0eeb-498e-8716-217bb2ee6ee3">
-      <Terms xmlns="http://schemas.microsoft.com/office/infopath/2007/PartnerControls">
-        <TermInfo xmlns="http://schemas.microsoft.com/office/infopath/2007/PartnerControls">
-          <TermName xmlns="http://schemas.microsoft.com/office/infopath/2007/PartnerControls">BUILD</TermName>
-          <TermId xmlns="http://schemas.microsoft.com/office/infopath/2007/PartnerControls">58542b36-5bf5-46a6-a53f-a41fb7a73785</TermId>
-        </TermInfo>
-      </Terms>
-    </Event1TaxHTField0>
-    <MS_x0020_Content_x0020_Owner xmlns="2295e2e7-0eeb-498e-8716-217bb2ee6ee3">
-      <UserInfo>
-        <DisplayName/>
-        <AccountId xsi:nil="true"/>
-        <AccountType/>
-      </UserInfo>
-    </MS_x0020_Content_x0020_Owner>
-    <Event_x0020_VenueTaxHTField0 xmlns="2295e2e7-0eeb-498e-8716-217bb2ee6ee3">
-      <Terms xmlns="http://schemas.microsoft.com/office/infopath/2007/PartnerControls"/>
-    </Event_x0020_VenueTaxHTField0>
-    <TaxCatchAll xmlns="230e9df3-be65-4c73-a93b-d1236ebd677e">
-      <Value>497</Value>
-      <Value>605</Value>
-    </TaxCatchAll>
-    <AudienceTaxHTField0 xmlns="8b529f77-48ab-4581-b468-93f09345b8aa">
-      <Terms xmlns="http://schemas.microsoft.com/office/infopath/2007/PartnerControls"/>
-    </AudienceTaxHTField0>
-  </documentManagement>
-</p:properties>
-</file>
-
-<file path=customXml/item2.xml><?xml version="1.0" encoding="utf-8"?>
-<?mso-contentType ?>
-<FormTemplates xmlns="http://schemas.microsoft.com/sharepoint/v3/contenttype/forms">
-  <Display>DocumentLibraryForm</Display>
-  <Edit>DocumentLibraryForm</Edit>
-  <New>DocumentLibraryForm</New>
-</FormTemplates>
-</file>
-
-<file path=customXml/item3.xml><?xml version="1.0" encoding="utf-8"?>
 <ct:contentTypeSchema xmlns:ct="http://schemas.microsoft.com/office/2006/metadata/contentType" xmlns:ma="http://schemas.microsoft.com/office/2006/metadata/properties/metaAttributes" ct:_="" ma:_="" ma:contentTypeName="PresentationsDoc" ma:contentTypeID="0x010100B88FC3ECA26D1C46B3C4C83281D2EB9C003BBE479AF4108146A616B6B5E7069DBC" ma:contentTypeVersion="61" ma:contentTypeDescription="" ma:contentTypeScope="" ma:versionID="89fe5faf2f25a24617a4f509b32cc989">
   <xsd:schema xmlns:xsd="http://www.w3.org/2001/XMLSchema" xmlns:xs="http://www.w3.org/2001/XMLSchema" xmlns:p="http://schemas.microsoft.com/office/2006/metadata/properties" xmlns:ns2="2295e2e7-0eeb-498e-8716-217bb2ee6ee3" xmlns:ns3="230e9df3-be65-4c73-a93b-d1236ebd677e" xmlns:ns4="8b529f77-48ab-4581-b468-93f09345b8aa" targetNamespace="http://schemas.microsoft.com/office/2006/metadata/properties" ma:root="true" ma:fieldsID="dfcb5511298a0ed35e170e5fd997f4f9" ns2:_="" ns3:_="" ns4:_="">
     <xsd:import namespace="2295e2e7-0eeb-498e-8716-217bb2ee6ee3"/>
@@ -7341,33 +6722,77 @@
 </ct:contentTypeSchema>
 </file>
 
-<file path=customXml/itemProps1.xml><?xml version="1.0" encoding="utf-8"?>
-<ds:datastoreItem xmlns:ds="http://schemas.openxmlformats.org/officeDocument/2006/customXml" ds:itemID="{F990F116-B58F-4255-B05B-DA3808E0E5C6}">
-  <ds:schemaRefs>
-    <ds:schemaRef ds:uri="8b529f77-48ab-4581-b468-93f09345b8aa"/>
-    <ds:schemaRef ds:uri="http://purl.org/dc/elements/1.1/"/>
-    <ds:schemaRef ds:uri="http://www.w3.org/XML/1998/namespace"/>
-    <ds:schemaRef ds:uri="http://purl.org/dc/terms/"/>
-    <ds:schemaRef ds:uri="230e9df3-be65-4c73-a93b-d1236ebd677e"/>
-    <ds:schemaRef ds:uri="http://schemas.microsoft.com/office/2006/documentManagement/types"/>
-    <ds:schemaRef ds:uri="http://schemas.openxmlformats.org/package/2006/metadata/core-properties"/>
-    <ds:schemaRef ds:uri="http://schemas.microsoft.com/office/2006/metadata/properties"/>
-    <ds:schemaRef ds:uri="http://schemas.microsoft.com/office/infopath/2007/PartnerControls"/>
-    <ds:schemaRef ds:uri="2295e2e7-0eeb-498e-8716-217bb2ee6ee3"/>
-    <ds:schemaRef ds:uri="http://purl.org/dc/dcmitype/"/>
-  </ds:schemaRefs>
-</ds:datastoreItem>
+<file path=customXml/item2.xml><?xml version="1.0" encoding="utf-8"?>
+<?mso-contentType ?>
+<FormTemplates xmlns="http://schemas.microsoft.com/sharepoint/v3/contenttype/forms">
+  <Display>DocumentLibraryForm</Display>
+  <Edit>DocumentLibraryForm</Edit>
+  <New>DocumentLibraryForm</New>
+</FormTemplates>
 </file>
 
-<file path=customXml/itemProps2.xml><?xml version="1.0" encoding="utf-8"?>
-<ds:datastoreItem xmlns:ds="http://schemas.openxmlformats.org/officeDocument/2006/customXml" ds:itemID="{758FDAC0-319D-4A54-8D8E-1D42CB1F8004}">
-  <ds:schemaRefs>
-    <ds:schemaRef ds:uri="http://schemas.microsoft.com/sharepoint/v3/contenttype/forms"/>
-  </ds:schemaRefs>
-</ds:datastoreItem>
+<file path=customXml/item3.xml><?xml version="1.0" encoding="utf-8"?>
+<p:properties xmlns:p="http://schemas.microsoft.com/office/2006/metadata/properties" xmlns:xsi="http://www.w3.org/2001/XMLSchema-instance" xmlns:pc="http://schemas.microsoft.com/office/infopath/2007/PartnerControls">
+  <documentManagement>
+    <TrackTaxHTField0 xmlns="2295e2e7-0eeb-498e-8716-217bb2ee6ee3">
+      <Terms xmlns="http://schemas.microsoft.com/office/infopath/2007/PartnerControls"/>
+    </TrackTaxHTField0>
+    <CampaignTaxHTField0 xmlns="2295e2e7-0eeb-498e-8716-217bb2ee6ee3">
+      <Terms xmlns="http://schemas.microsoft.com/office/infopath/2007/PartnerControls"/>
+    </CampaignTaxHTField0>
+    <Event_x0020_End_x0020_Date xmlns="2295e2e7-0eeb-498e-8716-217bb2ee6ee3">2013-06-28T07:00:00+00:00</Event_x0020_End_x0020_Date>
+    <Event_x0020_Start_x0020_Date xmlns="2295e2e7-0eeb-498e-8716-217bb2ee6ee3">2013-06-26T07:00:00+00:00</Event_x0020_Start_x0020_Date>
+    <MS_x0020_Speaker xmlns="2295e2e7-0eeb-498e-8716-217bb2ee6ee3">
+      <UserInfo>
+        <DisplayName/>
+        <AccountId xsi:nil="true"/>
+        <AccountType/>
+      </UserInfo>
+    </MS_x0020_Speaker>
+    <External_x0020_Speaker xmlns="2295e2e7-0eeb-498e-8716-217bb2ee6ee3" xsi:nil="true"/>
+    <Session_x0020_Code xmlns="2295e2e7-0eeb-498e-8716-217bb2ee6ee3" xsi:nil="true"/>
+    <ProductTaxHTField0 xmlns="2295e2e7-0eeb-498e-8716-217bb2ee6ee3">
+      <Terms xmlns="http://schemas.microsoft.com/office/infopath/2007/PartnerControls"/>
+    </ProductTaxHTField0>
+    <Presentation_x0020_Date xmlns="2295e2e7-0eeb-498e-8716-217bb2ee6ee3">2013-06-26T00:00:00-07:00</Presentation_x0020_Date>
+    <Event_x0020_LocationTaxHTField0 xmlns="2295e2e7-0eeb-498e-8716-217bb2ee6ee3">
+      <Terms xmlns="http://schemas.microsoft.com/office/infopath/2007/PartnerControls">
+        <TermInfo xmlns="http://schemas.microsoft.com/office/infopath/2007/PartnerControls">
+          <TermName xmlns="http://schemas.microsoft.com/office/infopath/2007/PartnerControls">San Francisco</TermName>
+          <TermId xmlns="http://schemas.microsoft.com/office/infopath/2007/PartnerControls">84dfcb53-432b-499d-8965-93d483d36b4a</TermId>
+        </TermInfo>
+      </Terms>
+    </Event_x0020_LocationTaxHTField0>
+    <Event1TaxHTField0 xmlns="2295e2e7-0eeb-498e-8716-217bb2ee6ee3">
+      <Terms xmlns="http://schemas.microsoft.com/office/infopath/2007/PartnerControls">
+        <TermInfo xmlns="http://schemas.microsoft.com/office/infopath/2007/PartnerControls">
+          <TermName xmlns="http://schemas.microsoft.com/office/infopath/2007/PartnerControls">BUILD</TermName>
+          <TermId xmlns="http://schemas.microsoft.com/office/infopath/2007/PartnerControls">58542b36-5bf5-46a6-a53f-a41fb7a73785</TermId>
+        </TermInfo>
+      </Terms>
+    </Event1TaxHTField0>
+    <MS_x0020_Content_x0020_Owner xmlns="2295e2e7-0eeb-498e-8716-217bb2ee6ee3">
+      <UserInfo>
+        <DisplayName/>
+        <AccountId xsi:nil="true"/>
+        <AccountType/>
+      </UserInfo>
+    </MS_x0020_Content_x0020_Owner>
+    <Event_x0020_VenueTaxHTField0 xmlns="2295e2e7-0eeb-498e-8716-217bb2ee6ee3">
+      <Terms xmlns="http://schemas.microsoft.com/office/infopath/2007/PartnerControls"/>
+    </Event_x0020_VenueTaxHTField0>
+    <TaxCatchAll xmlns="230e9df3-be65-4c73-a93b-d1236ebd677e">
+      <Value>497</Value>
+      <Value>605</Value>
+    </TaxCatchAll>
+    <AudienceTaxHTField0 xmlns="8b529f77-48ab-4581-b468-93f09345b8aa">
+      <Terms xmlns="http://schemas.microsoft.com/office/infopath/2007/PartnerControls"/>
+    </AudienceTaxHTField0>
+  </documentManagement>
+</p:properties>
 </file>
 
-<file path=customXml/itemProps3.xml><?xml version="1.0" encoding="utf-8"?>
+<file path=customXml/itemProps1.xml><?xml version="1.0" encoding="utf-8"?>
 <ds:datastoreItem xmlns:ds="http://schemas.openxmlformats.org/officeDocument/2006/customXml" ds:itemID="{0B689815-4B65-4FA2-B74B-E9A4DF6AE7AA}">
   <ds:schemaRefs>
     <ds:schemaRef ds:uri="http://schemas.microsoft.com/office/2006/metadata/contentType"/>
@@ -7385,4 +6810,30 @@
     <ds:schemaRef ds:uri="http://schemas.microsoft.com/internal/obd"/>
   </ds:schemaRefs>
 </ds:datastoreItem>
+</file>
+
+<file path=customXml/itemProps2.xml><?xml version="1.0" encoding="utf-8"?>
+<ds:datastoreItem xmlns:ds="http://schemas.openxmlformats.org/officeDocument/2006/customXml" ds:itemID="{758FDAC0-319D-4A54-8D8E-1D42CB1F8004}">
+  <ds:schemaRefs>
+    <ds:schemaRef ds:uri="http://schemas.microsoft.com/sharepoint/v3/contenttype/forms"/>
+  </ds:schemaRefs>
+</ds:datastoreItem>
+</file>
+
+<file path=customXml/itemProps3.xml><?xml version="1.0" encoding="utf-8"?>
+<ds:datastoreItem xmlns:ds="http://schemas.openxmlformats.org/officeDocument/2006/customXml" ds:itemID="{F990F116-B58F-4255-B05B-DA3808E0E5C6}">
+  <ds:schemaRefs>
+    <ds:schemaRef ds:uri="8b529f77-48ab-4581-b468-93f09345b8aa"/>
+    <ds:schemaRef ds:uri="http://purl.org/dc/elements/1.1/"/>
+    <ds:schemaRef ds:uri="http://www.w3.org/XML/1998/namespace"/>
+    <ds:schemaRef ds:uri="http://purl.org/dc/terms/"/>
+    <ds:schemaRef ds:uri="230e9df3-be65-4c73-a93b-d1236ebd677e"/>
+    <ds:schemaRef ds:uri="http://schemas.microsoft.com/office/2006/documentManagement/types"/>
+    <ds:schemaRef ds:uri="http://schemas.openxmlformats.org/package/2006/metadata/core-properties"/>
+    <ds:schemaRef ds:uri="http://schemas.microsoft.com/office/2006/metadata/properties"/>
+    <ds:schemaRef ds:uri="http://schemas.microsoft.com/office/infopath/2007/PartnerControls"/>
+    <ds:schemaRef ds:uri="2295e2e7-0eeb-498e-8716-217bb2ee6ee3"/>
+    <ds:schemaRef ds:uri="http://purl.org/dc/dcmitype/"/>
+  </ds:schemaRefs>
+</ds:datastoreItem>
 </file>
</xml_diff>